<commit_message>
Add title to slide after the fact
</commit_message>
<xml_diff>
--- a/inst/EcoHealthAlliancePPT16x9.pptx
+++ b/inst/EcoHealthAlliancePPT16x9.pptx
@@ -1337,42 +1337,6 @@
           </a:p>
         </p:txBody>
       </p:sp>
-      <p:pic>
-        <p:nvPicPr>
-          <p:cNvPr id="18" name="Picture 17">
-            <a:extLst>
-              <a:ext uri="{FF2B5EF4-FFF2-40B4-BE49-F238E27FC236}">
-                <a16:creationId xmlns:a16="http://schemas.microsoft.com/office/drawing/2014/main" id="{D52364A6-AB08-A040-BF0F-CB906553DA7D}"/>
-              </a:ext>
-            </a:extLst>
-          </p:cNvPr>
-          <p:cNvPicPr>
-            <a:picLocks noChangeAspect="1"/>
-          </p:cNvPicPr>
-          <p:nvPr userDrawn="1"/>
-        </p:nvPicPr>
-        <p:blipFill>
-          <a:blip r:embed="rId2">
-            <a:extLst>
-              <a:ext uri="{28A0092B-C50C-407E-A947-70E740481C1C}">
-                <a14:useLocalDpi xmlns:a14="http://schemas.microsoft.com/office/drawing/2010/main" val="0"/>
-              </a:ext>
-            </a:extLst>
-          </a:blip>
-          <a:stretch>
-            <a:fillRect/>
-          </a:stretch>
-        </p:blipFill>
-        <p:spPr>
-          <a:xfrm>
-            <a:off x="1003371" y="815398"/>
-            <a:ext cx="7952232" cy="2045208"/>
-          </a:xfrm>
-          <a:prstGeom prst="rect">
-            <a:avLst/>
-          </a:prstGeom>
-        </p:spPr>
-      </p:pic>
     </p:spTree>
   </p:cSld>
   <p:clrMapOvr>
@@ -6452,6 +6416,42 @@
           </a:p>
         </p:txBody>
       </p:sp>
+      <p:pic>
+        <p:nvPicPr>
+          <p:cNvPr id="4" name="Picture 3">
+            <a:extLst>
+              <a:ext uri="{FF2B5EF4-FFF2-40B4-BE49-F238E27FC236}">
+                <a16:creationId xmlns:a16="http://schemas.microsoft.com/office/drawing/2014/main" id="{11280789-43E0-B348-9443-9B9A0AC590B5}"/>
+              </a:ext>
+            </a:extLst>
+          </p:cNvPr>
+          <p:cNvPicPr>
+            <a:picLocks noChangeAspect="1"/>
+          </p:cNvPicPr>
+          <p:nvPr/>
+        </p:nvPicPr>
+        <p:blipFill>
+          <a:blip r:embed="rId3">
+            <a:extLst>
+              <a:ext uri="{28A0092B-C50C-407E-A947-70E740481C1C}">
+                <a14:useLocalDpi xmlns:a14="http://schemas.microsoft.com/office/drawing/2010/main" val="0"/>
+              </a:ext>
+            </a:extLst>
+          </a:blip>
+          <a:stretch>
+            <a:fillRect/>
+          </a:stretch>
+        </p:blipFill>
+        <p:spPr>
+          <a:xfrm>
+            <a:off x="1003371" y="815398"/>
+            <a:ext cx="7952232" cy="2045208"/>
+          </a:xfrm>
+          <a:prstGeom prst="rect">
+            <a:avLst/>
+          </a:prstGeom>
+        </p:spPr>
+      </p:pic>
     </p:spTree>
     <p:extLst>
       <p:ext uri="{BB962C8B-B14F-4D97-AF65-F5344CB8AC3E}">

</xml_diff>